<commit_message>
finished users model + register functionality
</commit_message>
<xml_diff>
--- a/public/images/cart-wp.pptx
+++ b/public/images/cart-wp.pptx
@@ -261,7 +261,7 @@
           <a:p>
             <a:fld id="{F55EE3FB-2143-479B-AFC5-2113EBFF36B5}" type="datetimeFigureOut">
               <a:rPr lang="he-IL" smtClean="0"/>
-              <a:t>י"ד/אלול/תשפ"א</a:t>
+              <a:t>ט"ו/אלול/תשפ"א</a:t>
             </a:fld>
             <a:endParaRPr lang="he-IL"/>
           </a:p>
@@ -461,7 +461,7 @@
           <a:p>
             <a:fld id="{F55EE3FB-2143-479B-AFC5-2113EBFF36B5}" type="datetimeFigureOut">
               <a:rPr lang="he-IL" smtClean="0"/>
-              <a:t>י"ד/אלול/תשפ"א</a:t>
+              <a:t>ט"ו/אלול/תשפ"א</a:t>
             </a:fld>
             <a:endParaRPr lang="he-IL"/>
           </a:p>
@@ -671,7 +671,7 @@
           <a:p>
             <a:fld id="{F55EE3FB-2143-479B-AFC5-2113EBFF36B5}" type="datetimeFigureOut">
               <a:rPr lang="he-IL" smtClean="0"/>
-              <a:t>י"ד/אלול/תשפ"א</a:t>
+              <a:t>ט"ו/אלול/תשפ"א</a:t>
             </a:fld>
             <a:endParaRPr lang="he-IL"/>
           </a:p>
@@ -871,7 +871,7 @@
           <a:p>
             <a:fld id="{F55EE3FB-2143-479B-AFC5-2113EBFF36B5}" type="datetimeFigureOut">
               <a:rPr lang="he-IL" smtClean="0"/>
-              <a:t>י"ד/אלול/תשפ"א</a:t>
+              <a:t>ט"ו/אלול/תשפ"א</a:t>
             </a:fld>
             <a:endParaRPr lang="he-IL"/>
           </a:p>
@@ -1147,7 +1147,7 @@
           <a:p>
             <a:fld id="{F55EE3FB-2143-479B-AFC5-2113EBFF36B5}" type="datetimeFigureOut">
               <a:rPr lang="he-IL" smtClean="0"/>
-              <a:t>י"ד/אלול/תשפ"א</a:t>
+              <a:t>ט"ו/אלול/תשפ"א</a:t>
             </a:fld>
             <a:endParaRPr lang="he-IL"/>
           </a:p>
@@ -1415,7 +1415,7 @@
           <a:p>
             <a:fld id="{F55EE3FB-2143-479B-AFC5-2113EBFF36B5}" type="datetimeFigureOut">
               <a:rPr lang="he-IL" smtClean="0"/>
-              <a:t>י"ד/אלול/תשפ"א</a:t>
+              <a:t>ט"ו/אלול/תשפ"א</a:t>
             </a:fld>
             <a:endParaRPr lang="he-IL"/>
           </a:p>
@@ -1830,7 +1830,7 @@
           <a:p>
             <a:fld id="{F55EE3FB-2143-479B-AFC5-2113EBFF36B5}" type="datetimeFigureOut">
               <a:rPr lang="he-IL" smtClean="0"/>
-              <a:t>י"ד/אלול/תשפ"א</a:t>
+              <a:t>ט"ו/אלול/תשפ"א</a:t>
             </a:fld>
             <a:endParaRPr lang="he-IL"/>
           </a:p>
@@ -1972,7 +1972,7 @@
           <a:p>
             <a:fld id="{F55EE3FB-2143-479B-AFC5-2113EBFF36B5}" type="datetimeFigureOut">
               <a:rPr lang="he-IL" smtClean="0"/>
-              <a:t>י"ד/אלול/תשפ"א</a:t>
+              <a:t>ט"ו/אלול/תשפ"א</a:t>
             </a:fld>
             <a:endParaRPr lang="he-IL"/>
           </a:p>
@@ -2085,7 +2085,7 @@
           <a:p>
             <a:fld id="{F55EE3FB-2143-479B-AFC5-2113EBFF36B5}" type="datetimeFigureOut">
               <a:rPr lang="he-IL" smtClean="0"/>
-              <a:t>י"ד/אלול/תשפ"א</a:t>
+              <a:t>ט"ו/אלול/תשפ"א</a:t>
             </a:fld>
             <a:endParaRPr lang="he-IL"/>
           </a:p>
@@ -2398,7 +2398,7 @@
           <a:p>
             <a:fld id="{F55EE3FB-2143-479B-AFC5-2113EBFF36B5}" type="datetimeFigureOut">
               <a:rPr lang="he-IL" smtClean="0"/>
-              <a:t>י"ד/אלול/תשפ"א</a:t>
+              <a:t>ט"ו/אלול/תשפ"א</a:t>
             </a:fld>
             <a:endParaRPr lang="he-IL"/>
           </a:p>
@@ -2687,7 +2687,7 @@
           <a:p>
             <a:fld id="{F55EE3FB-2143-479B-AFC5-2113EBFF36B5}" type="datetimeFigureOut">
               <a:rPr lang="he-IL" smtClean="0"/>
-              <a:t>י"ד/אלול/תשפ"א</a:t>
+              <a:t>ט"ו/אלול/תשפ"א</a:t>
             </a:fld>
             <a:endParaRPr lang="he-IL"/>
           </a:p>
@@ -2930,7 +2930,7 @@
           <a:p>
             <a:fld id="{F55EE3FB-2143-479B-AFC5-2113EBFF36B5}" type="datetimeFigureOut">
               <a:rPr lang="he-IL" smtClean="0"/>
-              <a:t>י"ד/אלול/תשפ"א</a:t>
+              <a:t>ט"ו/אלול/תשפ"א</a:t>
             </a:fld>
             <a:endParaRPr lang="he-IL"/>
           </a:p>

</xml_diff>

<commit_message>
added render stores items, products items, user details
</commit_message>
<xml_diff>
--- a/public/images/cart-wp.pptx
+++ b/public/images/cart-wp.pptx
@@ -261,7 +261,7 @@
           <a:p>
             <a:fld id="{F55EE3FB-2143-479B-AFC5-2113EBFF36B5}" type="datetimeFigureOut">
               <a:rPr lang="he-IL" smtClean="0"/>
-              <a:t>ט"ו/אלול/תשפ"א</a:t>
+              <a:t>י"ח/אלול/תשפ"א</a:t>
             </a:fld>
             <a:endParaRPr lang="he-IL"/>
           </a:p>
@@ -461,7 +461,7 @@
           <a:p>
             <a:fld id="{F55EE3FB-2143-479B-AFC5-2113EBFF36B5}" type="datetimeFigureOut">
               <a:rPr lang="he-IL" smtClean="0"/>
-              <a:t>ט"ו/אלול/תשפ"א</a:t>
+              <a:t>י"ח/אלול/תשפ"א</a:t>
             </a:fld>
             <a:endParaRPr lang="he-IL"/>
           </a:p>
@@ -671,7 +671,7 @@
           <a:p>
             <a:fld id="{F55EE3FB-2143-479B-AFC5-2113EBFF36B5}" type="datetimeFigureOut">
               <a:rPr lang="he-IL" smtClean="0"/>
-              <a:t>ט"ו/אלול/תשפ"א</a:t>
+              <a:t>י"ח/אלול/תשפ"א</a:t>
             </a:fld>
             <a:endParaRPr lang="he-IL"/>
           </a:p>
@@ -871,7 +871,7 @@
           <a:p>
             <a:fld id="{F55EE3FB-2143-479B-AFC5-2113EBFF36B5}" type="datetimeFigureOut">
               <a:rPr lang="he-IL" smtClean="0"/>
-              <a:t>ט"ו/אלול/תשפ"א</a:t>
+              <a:t>י"ח/אלול/תשפ"א</a:t>
             </a:fld>
             <a:endParaRPr lang="he-IL"/>
           </a:p>
@@ -1147,7 +1147,7 @@
           <a:p>
             <a:fld id="{F55EE3FB-2143-479B-AFC5-2113EBFF36B5}" type="datetimeFigureOut">
               <a:rPr lang="he-IL" smtClean="0"/>
-              <a:t>ט"ו/אלול/תשפ"א</a:t>
+              <a:t>י"ח/אלול/תשפ"א</a:t>
             </a:fld>
             <a:endParaRPr lang="he-IL"/>
           </a:p>
@@ -1415,7 +1415,7 @@
           <a:p>
             <a:fld id="{F55EE3FB-2143-479B-AFC5-2113EBFF36B5}" type="datetimeFigureOut">
               <a:rPr lang="he-IL" smtClean="0"/>
-              <a:t>ט"ו/אלול/תשפ"א</a:t>
+              <a:t>י"ח/אלול/תשפ"א</a:t>
             </a:fld>
             <a:endParaRPr lang="he-IL"/>
           </a:p>
@@ -1830,7 +1830,7 @@
           <a:p>
             <a:fld id="{F55EE3FB-2143-479B-AFC5-2113EBFF36B5}" type="datetimeFigureOut">
               <a:rPr lang="he-IL" smtClean="0"/>
-              <a:t>ט"ו/אלול/תשפ"א</a:t>
+              <a:t>י"ח/אלול/תשפ"א</a:t>
             </a:fld>
             <a:endParaRPr lang="he-IL"/>
           </a:p>
@@ -1972,7 +1972,7 @@
           <a:p>
             <a:fld id="{F55EE3FB-2143-479B-AFC5-2113EBFF36B5}" type="datetimeFigureOut">
               <a:rPr lang="he-IL" smtClean="0"/>
-              <a:t>ט"ו/אלול/תשפ"א</a:t>
+              <a:t>י"ח/אלול/תשפ"א</a:t>
             </a:fld>
             <a:endParaRPr lang="he-IL"/>
           </a:p>
@@ -2085,7 +2085,7 @@
           <a:p>
             <a:fld id="{F55EE3FB-2143-479B-AFC5-2113EBFF36B5}" type="datetimeFigureOut">
               <a:rPr lang="he-IL" smtClean="0"/>
-              <a:t>ט"ו/אלול/תשפ"א</a:t>
+              <a:t>י"ח/אלול/תשפ"א</a:t>
             </a:fld>
             <a:endParaRPr lang="he-IL"/>
           </a:p>
@@ -2398,7 +2398,7 @@
           <a:p>
             <a:fld id="{F55EE3FB-2143-479B-AFC5-2113EBFF36B5}" type="datetimeFigureOut">
               <a:rPr lang="he-IL" smtClean="0"/>
-              <a:t>ט"ו/אלול/תשפ"א</a:t>
+              <a:t>י"ח/אלול/תשפ"א</a:t>
             </a:fld>
             <a:endParaRPr lang="he-IL"/>
           </a:p>
@@ -2687,7 +2687,7 @@
           <a:p>
             <a:fld id="{F55EE3FB-2143-479B-AFC5-2113EBFF36B5}" type="datetimeFigureOut">
               <a:rPr lang="he-IL" smtClean="0"/>
-              <a:t>ט"ו/אלול/תשפ"א</a:t>
+              <a:t>י"ח/אלול/תשפ"א</a:t>
             </a:fld>
             <a:endParaRPr lang="he-IL"/>
           </a:p>
@@ -2930,7 +2930,7 @@
           <a:p>
             <a:fld id="{F55EE3FB-2143-479B-AFC5-2113EBFF36B5}" type="datetimeFigureOut">
               <a:rPr lang="he-IL" smtClean="0"/>
-              <a:t>ט"ו/אלול/תשפ"א</a:t>
+              <a:t>י"ח/אלול/תשפ"א</a:t>
             </a:fld>
             <a:endParaRPr lang="he-IL"/>
           </a:p>
@@ -3349,10 +3349,10 @@
       </p:grpSpPr>
       <p:sp>
         <p:nvSpPr>
-          <p:cNvPr id="4" name="Isosceles Triangle 3">
-            <a:extLst>
-              <a:ext uri="{FF2B5EF4-FFF2-40B4-BE49-F238E27FC236}">
-                <a16:creationId xmlns:a16="http://schemas.microsoft.com/office/drawing/2014/main" id="{E2D486A1-8D2C-4673-9C30-BABB38D56F5C}"/>
+          <p:cNvPr id="15" name="Rectangle: Diagonal Corners Rounded 14">
+            <a:extLst>
+              <a:ext uri="{FF2B5EF4-FFF2-40B4-BE49-F238E27FC236}">
+                <a16:creationId xmlns:a16="http://schemas.microsoft.com/office/drawing/2014/main" id="{CEAA294D-A8D6-4B02-9EBD-F0E40E3ED3E3}"/>
               </a:ext>
             </a:extLst>
           </p:cNvPr>
@@ -3360,25 +3360,25 @@
           <p:nvPr/>
         </p:nvSpPr>
         <p:spPr>
-          <a:xfrm rot="1101555">
-            <a:off x="6177792" y="5099239"/>
-            <a:ext cx="252000" cy="252000"/>
+          <a:xfrm rot="3330257">
+            <a:off x="6136480" y="4963171"/>
+            <a:ext cx="383681" cy="309579"/>
           </a:xfrm>
-          <a:prstGeom prst="triangle">
+          <a:prstGeom prst="round2DiagRect">
             <a:avLst/>
           </a:prstGeom>
         </p:spPr>
         <p:style>
           <a:lnRef idx="2">
-            <a:schemeClr val="accent5">
+            <a:schemeClr val="accent1">
               <a:shade val="50000"/>
             </a:schemeClr>
           </a:lnRef>
           <a:fillRef idx="1">
-            <a:schemeClr val="accent5"/>
+            <a:schemeClr val="accent1"/>
           </a:fillRef>
           <a:effectRef idx="0">
-            <a:schemeClr val="accent5"/>
+            <a:schemeClr val="accent1"/>
           </a:effectRef>
           <a:fontRef idx="minor">
             <a:schemeClr val="lt1"/>
@@ -3395,10 +3395,10 @@
       </p:sp>
       <p:sp>
         <p:nvSpPr>
-          <p:cNvPr id="3" name="Rectangle: Rounded Corners 2">
-            <a:extLst>
-              <a:ext uri="{FF2B5EF4-FFF2-40B4-BE49-F238E27FC236}">
-                <a16:creationId xmlns:a16="http://schemas.microsoft.com/office/drawing/2014/main" id="{4B6F66E9-9B08-4814-99B9-4C81A3211C1F}"/>
+          <p:cNvPr id="14" name="Isosceles Triangle 13">
+            <a:extLst>
+              <a:ext uri="{FF2B5EF4-FFF2-40B4-BE49-F238E27FC236}">
+                <a16:creationId xmlns:a16="http://schemas.microsoft.com/office/drawing/2014/main" id="{A1D29C30-2974-45E4-8D29-0C0EDD58B69C}"/>
               </a:ext>
             </a:extLst>
           </p:cNvPr>
@@ -3406,9 +3406,163 @@
           <p:nvPr/>
         </p:nvSpPr>
         <p:spPr>
-          <a:xfrm rot="2455083">
-            <a:off x="6434357" y="5185765"/>
-            <a:ext cx="98425" cy="314325"/>
+          <a:xfrm>
+            <a:off x="6205539" y="5208531"/>
+            <a:ext cx="239932" cy="197156"/>
+          </a:xfrm>
+          <a:prstGeom prst="triangle">
+            <a:avLst/>
+          </a:prstGeom>
+          <a:solidFill>
+            <a:srgbClr val="7030A0"/>
+          </a:solidFill>
+          <a:ln>
+            <a:solidFill>
+              <a:srgbClr val="002060"/>
+            </a:solidFill>
+          </a:ln>
+        </p:spPr>
+        <p:style>
+          <a:lnRef idx="2">
+            <a:schemeClr val="accent1">
+              <a:shade val="50000"/>
+            </a:schemeClr>
+          </a:lnRef>
+          <a:fillRef idx="1">
+            <a:schemeClr val="accent1"/>
+          </a:fillRef>
+          <a:effectRef idx="0">
+            <a:schemeClr val="accent1"/>
+          </a:effectRef>
+          <a:fontRef idx="minor">
+            <a:schemeClr val="lt1"/>
+          </a:fontRef>
+        </p:style>
+        <p:txBody>
+          <a:bodyPr rtlCol="1" anchor="ctr"/>
+          <a:lstStyle/>
+          <a:p>
+            <a:pPr algn="ctr"/>
+            <a:endParaRPr lang="he-IL"/>
+          </a:p>
+        </p:txBody>
+      </p:sp>
+      <p:sp>
+        <p:nvSpPr>
+          <p:cNvPr id="2" name="Oval 1">
+            <a:extLst>
+              <a:ext uri="{FF2B5EF4-FFF2-40B4-BE49-F238E27FC236}">
+                <a16:creationId xmlns:a16="http://schemas.microsoft.com/office/drawing/2014/main" id="{396FBF46-622D-47B1-9A0C-2CC390F842C9}"/>
+              </a:ext>
+            </a:extLst>
+          </p:cNvPr>
+          <p:cNvSpPr/>
+          <p:nvPr/>
+        </p:nvSpPr>
+        <p:spPr>
+          <a:xfrm>
+            <a:off x="6000805" y="4974810"/>
+            <a:ext cx="321245" cy="314193"/>
+          </a:xfrm>
+          <a:prstGeom prst="ellipse">
+            <a:avLst/>
+          </a:prstGeom>
+        </p:spPr>
+        <p:style>
+          <a:lnRef idx="2">
+            <a:schemeClr val="accent4">
+              <a:shade val="50000"/>
+            </a:schemeClr>
+          </a:lnRef>
+          <a:fillRef idx="1">
+            <a:schemeClr val="accent4"/>
+          </a:fillRef>
+          <a:effectRef idx="0">
+            <a:schemeClr val="accent4"/>
+          </a:effectRef>
+          <a:fontRef idx="minor">
+            <a:schemeClr val="lt1"/>
+          </a:fontRef>
+        </p:style>
+        <p:txBody>
+          <a:bodyPr rtlCol="1" anchor="ctr"/>
+          <a:lstStyle/>
+          <a:p>
+            <a:pPr algn="ctr"/>
+            <a:endParaRPr lang="he-IL"/>
+          </a:p>
+        </p:txBody>
+      </p:sp>
+      <p:sp>
+        <p:nvSpPr>
+          <p:cNvPr id="13" name="Heart 12">
+            <a:extLst>
+              <a:ext uri="{FF2B5EF4-FFF2-40B4-BE49-F238E27FC236}">
+                <a16:creationId xmlns:a16="http://schemas.microsoft.com/office/drawing/2014/main" id="{216758FF-D533-4E8C-AE62-425FFAD52E66}"/>
+              </a:ext>
+            </a:extLst>
+          </p:cNvPr>
+          <p:cNvSpPr/>
+          <p:nvPr/>
+        </p:nvSpPr>
+        <p:spPr>
+          <a:xfrm rot="18731453">
+            <a:off x="6047599" y="5234855"/>
+            <a:ext cx="225392" cy="226218"/>
+          </a:xfrm>
+          <a:prstGeom prst="heart">
+            <a:avLst/>
+          </a:prstGeom>
+          <a:solidFill>
+            <a:srgbClr val="FF0000"/>
+          </a:solidFill>
+          <a:ln>
+            <a:solidFill>
+              <a:srgbClr val="C00000"/>
+            </a:solidFill>
+          </a:ln>
+        </p:spPr>
+        <p:style>
+          <a:lnRef idx="2">
+            <a:schemeClr val="accent2">
+              <a:shade val="50000"/>
+            </a:schemeClr>
+          </a:lnRef>
+          <a:fillRef idx="1">
+            <a:schemeClr val="accent2"/>
+          </a:fillRef>
+          <a:effectRef idx="0">
+            <a:schemeClr val="accent2"/>
+          </a:effectRef>
+          <a:fontRef idx="minor">
+            <a:schemeClr val="lt1"/>
+          </a:fontRef>
+        </p:style>
+        <p:txBody>
+          <a:bodyPr rtlCol="1" anchor="ctr"/>
+          <a:lstStyle/>
+          <a:p>
+            <a:pPr algn="ctr"/>
+            <a:endParaRPr lang="he-IL"/>
+          </a:p>
+        </p:txBody>
+      </p:sp>
+      <p:sp>
+        <p:nvSpPr>
+          <p:cNvPr id="3" name="Rectangle: Rounded Corners 2">
+            <a:extLst>
+              <a:ext uri="{FF2B5EF4-FFF2-40B4-BE49-F238E27FC236}">
+                <a16:creationId xmlns:a16="http://schemas.microsoft.com/office/drawing/2014/main" id="{4B6F66E9-9B08-4814-99B9-4C81A3211C1F}"/>
+              </a:ext>
+            </a:extLst>
+          </p:cNvPr>
+          <p:cNvSpPr/>
+          <p:nvPr/>
+        </p:nvSpPr>
+        <p:spPr>
+          <a:xfrm rot="442833">
+            <a:off x="6389581" y="5013687"/>
+            <a:ext cx="208154" cy="370641"/>
           </a:xfrm>
           <a:prstGeom prst="roundRect">
             <a:avLst/>
@@ -3435,62 +3589,16 @@
           <a:lstStyle/>
           <a:p>
             <a:pPr algn="ctr"/>
-            <a:endParaRPr lang="he-IL"/>
-          </a:p>
-        </p:txBody>
-      </p:sp>
-      <p:sp>
-        <p:nvSpPr>
-          <p:cNvPr id="2" name="Oval 1">
-            <a:extLst>
-              <a:ext uri="{FF2B5EF4-FFF2-40B4-BE49-F238E27FC236}">
-                <a16:creationId xmlns:a16="http://schemas.microsoft.com/office/drawing/2014/main" id="{396FBF46-622D-47B1-9A0C-2CC390F842C9}"/>
-              </a:ext>
-            </a:extLst>
-          </p:cNvPr>
-          <p:cNvSpPr/>
-          <p:nvPr/>
-        </p:nvSpPr>
-        <p:spPr>
-          <a:xfrm>
-            <a:off x="6073775" y="5327650"/>
-            <a:ext cx="180000" cy="180000"/>
-          </a:xfrm>
-          <a:prstGeom prst="ellipse">
-            <a:avLst/>
-          </a:prstGeom>
-        </p:spPr>
-        <p:style>
-          <a:lnRef idx="2">
-            <a:schemeClr val="accent4">
-              <a:shade val="50000"/>
-            </a:schemeClr>
-          </a:lnRef>
-          <a:fillRef idx="1">
-            <a:schemeClr val="accent4"/>
-          </a:fillRef>
-          <a:effectRef idx="0">
-            <a:schemeClr val="accent4"/>
-          </a:effectRef>
-          <a:fontRef idx="minor">
-            <a:schemeClr val="lt1"/>
-          </a:fontRef>
-        </p:style>
-        <p:txBody>
-          <a:bodyPr rtlCol="1" anchor="ctr"/>
-          <a:lstStyle/>
-          <a:p>
-            <a:pPr algn="ctr"/>
-            <a:endParaRPr lang="he-IL"/>
+            <a:endParaRPr lang="he-IL" dirty="0"/>
           </a:p>
         </p:txBody>
       </p:sp>
       <p:pic>
         <p:nvPicPr>
-          <p:cNvPr id="5" name="Graphic 4" descr="Shopping cart outline">
-            <a:extLst>
-              <a:ext uri="{FF2B5EF4-FFF2-40B4-BE49-F238E27FC236}">
-                <a16:creationId xmlns:a16="http://schemas.microsoft.com/office/drawing/2014/main" id="{4236F7C5-AF2E-4542-8DC9-8E5CC8EA0262}"/>
+          <p:cNvPr id="11" name="Graphic 10" descr="Shopping cart outline">
+            <a:extLst>
+              <a:ext uri="{FF2B5EF4-FFF2-40B4-BE49-F238E27FC236}">
+                <a16:creationId xmlns:a16="http://schemas.microsoft.com/office/drawing/2014/main" id="{75CD847B-67D6-4EC5-9B88-BDC98CB10677}"/>
               </a:ext>
             </a:extLst>
           </p:cNvPr>
@@ -3507,6 +3615,45 @@
               </a:ext>
               <a:ext uri="{96DAC541-7B7A-43D3-8B79-37D633B846F1}">
                 <asvg:svgBlip xmlns:asvg="http://schemas.microsoft.com/office/drawing/2016/SVG/main" r:embed="rId3"/>
+              </a:ext>
+            </a:extLst>
+          </a:blip>
+          <a:stretch>
+            <a:fillRect/>
+          </a:stretch>
+        </p:blipFill>
+        <p:spPr>
+          <a:xfrm>
+            <a:off x="5855649" y="4890764"/>
+            <a:ext cx="914400" cy="914400"/>
+          </a:xfrm>
+          <a:prstGeom prst="rect">
+            <a:avLst/>
+          </a:prstGeom>
+        </p:spPr>
+      </p:pic>
+      <p:pic>
+        <p:nvPicPr>
+          <p:cNvPr id="5" name="Graphic 4" descr="Shopping cart outline">
+            <a:extLst>
+              <a:ext uri="{FF2B5EF4-FFF2-40B4-BE49-F238E27FC236}">
+                <a16:creationId xmlns:a16="http://schemas.microsoft.com/office/drawing/2014/main" id="{4236F7C5-AF2E-4542-8DC9-8E5CC8EA0262}"/>
+              </a:ext>
+            </a:extLst>
+          </p:cNvPr>
+          <p:cNvPicPr>
+            <a:picLocks noChangeAspect="1"/>
+          </p:cNvPicPr>
+          <p:nvPr/>
+        </p:nvPicPr>
+        <p:blipFill>
+          <a:blip r:embed="rId4">
+            <a:extLst>
+              <a:ext uri="{28A0092B-C50C-407E-A947-70E740481C1C}">
+                <a14:useLocalDpi xmlns:a14="http://schemas.microsoft.com/office/drawing/2010/main" val="0"/>
+              </a:ext>
+              <a:ext uri="{96DAC541-7B7A-43D3-8B79-37D633B846F1}">
+                <asvg:svgBlip xmlns:asvg="http://schemas.microsoft.com/office/drawing/2016/SVG/main" r:embed="rId5"/>
               </a:ext>
             </a:extLst>
           </a:blip>
@@ -3539,13 +3686,13 @@
           <p:nvPr/>
         </p:nvPicPr>
         <p:blipFill>
-          <a:blip r:embed="rId2">
+          <a:blip r:embed="rId4">
             <a:extLst>
               <a:ext uri="{28A0092B-C50C-407E-A947-70E740481C1C}">
                 <a14:useLocalDpi xmlns:a14="http://schemas.microsoft.com/office/drawing/2010/main" val="0"/>
               </a:ext>
               <a:ext uri="{96DAC541-7B7A-43D3-8B79-37D633B846F1}">
-                <asvg:svgBlip xmlns:asvg="http://schemas.microsoft.com/office/drawing/2016/SVG/main" r:embed="rId3"/>
+                <asvg:svgBlip xmlns:asvg="http://schemas.microsoft.com/office/drawing/2016/SVG/main" r:embed="rId5"/>
               </a:ext>
             </a:extLst>
           </a:blip>
@@ -3578,13 +3725,13 @@
           <p:nvPr/>
         </p:nvPicPr>
         <p:blipFill>
-          <a:blip r:embed="rId2">
+          <a:blip r:embed="rId4">
             <a:extLst>
               <a:ext uri="{28A0092B-C50C-407E-A947-70E740481C1C}">
                 <a14:useLocalDpi xmlns:a14="http://schemas.microsoft.com/office/drawing/2010/main" val="0"/>
               </a:ext>
               <a:ext uri="{96DAC541-7B7A-43D3-8B79-37D633B846F1}">
-                <asvg:svgBlip xmlns:asvg="http://schemas.microsoft.com/office/drawing/2016/SVG/main" r:embed="rId3"/>
+                <asvg:svgBlip xmlns:asvg="http://schemas.microsoft.com/office/drawing/2016/SVG/main" r:embed="rId5"/>
               </a:ext>
             </a:extLst>
           </a:blip>
@@ -3617,13 +3764,13 @@
           <p:nvPr/>
         </p:nvPicPr>
         <p:blipFill>
-          <a:blip r:embed="rId2">
+          <a:blip r:embed="rId4">
             <a:extLst>
               <a:ext uri="{28A0092B-C50C-407E-A947-70E740481C1C}">
                 <a14:useLocalDpi xmlns:a14="http://schemas.microsoft.com/office/drawing/2010/main" val="0"/>
               </a:ext>
               <a:ext uri="{96DAC541-7B7A-43D3-8B79-37D633B846F1}">
-                <asvg:svgBlip xmlns:asvg="http://schemas.microsoft.com/office/drawing/2016/SVG/main" r:embed="rId3"/>
+                <asvg:svgBlip xmlns:asvg="http://schemas.microsoft.com/office/drawing/2016/SVG/main" r:embed="rId5"/>
               </a:ext>
             </a:extLst>
           </a:blip>
@@ -3656,13 +3803,13 @@
           <p:nvPr/>
         </p:nvPicPr>
         <p:blipFill>
-          <a:blip r:embed="rId2">
+          <a:blip r:embed="rId4">
             <a:extLst>
               <a:ext uri="{28A0092B-C50C-407E-A947-70E740481C1C}">
                 <a14:useLocalDpi xmlns:a14="http://schemas.microsoft.com/office/drawing/2010/main" val="0"/>
               </a:ext>
               <a:ext uri="{96DAC541-7B7A-43D3-8B79-37D633B846F1}">
-                <asvg:svgBlip xmlns:asvg="http://schemas.microsoft.com/office/drawing/2016/SVG/main" r:embed="rId3"/>
+                <asvg:svgBlip xmlns:asvg="http://schemas.microsoft.com/office/drawing/2016/SVG/main" r:embed="rId5"/>
               </a:ext>
             </a:extLst>
           </a:blip>
@@ -3695,13 +3842,13 @@
           <p:nvPr/>
         </p:nvPicPr>
         <p:blipFill>
-          <a:blip r:embed="rId2">
+          <a:blip r:embed="rId4">
             <a:extLst>
               <a:ext uri="{28A0092B-C50C-407E-A947-70E740481C1C}">
                 <a14:useLocalDpi xmlns:a14="http://schemas.microsoft.com/office/drawing/2010/main" val="0"/>
               </a:ext>
               <a:ext uri="{96DAC541-7B7A-43D3-8B79-37D633B846F1}">
-                <asvg:svgBlip xmlns:asvg="http://schemas.microsoft.com/office/drawing/2016/SVG/main" r:embed="rId3"/>
+                <asvg:svgBlip xmlns:asvg="http://schemas.microsoft.com/office/drawing/2016/SVG/main" r:embed="rId5"/>
               </a:ext>
             </a:extLst>
           </a:blip>
@@ -3721,10 +3868,10 @@
       </p:pic>
       <p:pic>
         <p:nvPicPr>
-          <p:cNvPr id="11" name="Graphic 10" descr="Shopping cart outline">
-            <a:extLst>
-              <a:ext uri="{FF2B5EF4-FFF2-40B4-BE49-F238E27FC236}">
-                <a16:creationId xmlns:a16="http://schemas.microsoft.com/office/drawing/2014/main" id="{75CD847B-67D6-4EC5-9B88-BDC98CB10677}"/>
+          <p:cNvPr id="16" name="Graphic 15" descr="Shopping cart outline">
+            <a:extLst>
+              <a:ext uri="{FF2B5EF4-FFF2-40B4-BE49-F238E27FC236}">
+                <a16:creationId xmlns:a16="http://schemas.microsoft.com/office/drawing/2014/main" id="{8AA2F912-3AE3-434A-AB23-DA7FB150DCE4}"/>
               </a:ext>
             </a:extLst>
           </p:cNvPr>
@@ -3734,13 +3881,13 @@
           <p:nvPr/>
         </p:nvPicPr>
         <p:blipFill>
-          <a:blip r:embed="rId4">
+          <a:blip r:embed="rId6">
             <a:extLst>
               <a:ext uri="{28A0092B-C50C-407E-A947-70E740481C1C}">
                 <a14:useLocalDpi xmlns:a14="http://schemas.microsoft.com/office/drawing/2010/main" val="0"/>
               </a:ext>
               <a:ext uri="{96DAC541-7B7A-43D3-8B79-37D633B846F1}">
-                <asvg:svgBlip xmlns:asvg="http://schemas.microsoft.com/office/drawing/2016/SVG/main" r:embed="rId5"/>
+                <asvg:svgBlip xmlns:asvg="http://schemas.microsoft.com/office/drawing/2016/SVG/main" r:embed="rId7"/>
               </a:ext>
             </a:extLst>
           </a:blip>
@@ -3750,14 +3897,71 @@
         </p:blipFill>
         <p:spPr>
           <a:xfrm>
-            <a:off x="5856850" y="4964669"/>
-            <a:ext cx="914400" cy="914400"/>
+            <a:off x="4689254" y="5217137"/>
+            <a:ext cx="810000" cy="810000"/>
           </a:xfrm>
           <a:prstGeom prst="rect">
             <a:avLst/>
           </a:prstGeom>
         </p:spPr>
       </p:pic>
+      <p:sp>
+        <p:nvSpPr>
+          <p:cNvPr id="17" name="Arc 16">
+            <a:extLst>
+              <a:ext uri="{FF2B5EF4-FFF2-40B4-BE49-F238E27FC236}">
+                <a16:creationId xmlns:a16="http://schemas.microsoft.com/office/drawing/2014/main" id="{FF258B6E-FCEF-4953-AC70-2FB70DF4C8D3}"/>
+              </a:ext>
+            </a:extLst>
+          </p:cNvPr>
+          <p:cNvSpPr/>
+          <p:nvPr/>
+        </p:nvSpPr>
+        <p:spPr>
+          <a:xfrm>
+            <a:off x="4642921" y="5127137"/>
+            <a:ext cx="900000" cy="900000"/>
+          </a:xfrm>
+          <a:prstGeom prst="arc">
+            <a:avLst>
+              <a:gd name="adj1" fmla="val 17555401"/>
+              <a:gd name="adj2" fmla="val 14344439"/>
+            </a:avLst>
+          </a:prstGeom>
+          <a:ln w="57150">
+            <a:solidFill>
+              <a:schemeClr val="tx1">
+                <a:lumMod val="75000"/>
+                <a:lumOff val="25000"/>
+              </a:schemeClr>
+            </a:solidFill>
+            <a:headEnd type="stealth" w="med" len="med"/>
+            <a:tailEnd type="none" w="lg" len="lg"/>
+          </a:ln>
+        </p:spPr>
+        <p:style>
+          <a:lnRef idx="1">
+            <a:schemeClr val="accent1"/>
+          </a:lnRef>
+          <a:fillRef idx="0">
+            <a:schemeClr val="accent1"/>
+          </a:fillRef>
+          <a:effectRef idx="0">
+            <a:schemeClr val="accent1"/>
+          </a:effectRef>
+          <a:fontRef idx="minor">
+            <a:schemeClr val="tx1"/>
+          </a:fontRef>
+        </p:style>
+        <p:txBody>
+          <a:bodyPr rtlCol="1" anchor="ctr"/>
+          <a:lstStyle/>
+          <a:p>
+            <a:pPr algn="ctr"/>
+            <a:endParaRPr lang="he-IL" dirty="0"/>
+          </a:p>
+        </p:txBody>
+      </p:sp>
     </p:spTree>
     <p:extLst>
       <p:ext uri="{BB962C8B-B14F-4D97-AF65-F5344CB8AC3E}">

</xml_diff>

<commit_message>
working on product design in store
</commit_message>
<xml_diff>
--- a/public/images/cart-wp.pptx
+++ b/public/images/cart-wp.pptx
@@ -261,7 +261,7 @@
           <a:p>
             <a:fld id="{F55EE3FB-2143-479B-AFC5-2113EBFF36B5}" type="datetimeFigureOut">
               <a:rPr lang="he-IL" smtClean="0"/>
-              <a:t>י"ט/אלול/תשפ"א</a:t>
+              <a:t>כ"א/אלול/תשפ"א</a:t>
             </a:fld>
             <a:endParaRPr lang="he-IL"/>
           </a:p>
@@ -461,7 +461,7 @@
           <a:p>
             <a:fld id="{F55EE3FB-2143-479B-AFC5-2113EBFF36B5}" type="datetimeFigureOut">
               <a:rPr lang="he-IL" smtClean="0"/>
-              <a:t>י"ט/אלול/תשפ"א</a:t>
+              <a:t>כ"א/אלול/תשפ"א</a:t>
             </a:fld>
             <a:endParaRPr lang="he-IL"/>
           </a:p>
@@ -671,7 +671,7 @@
           <a:p>
             <a:fld id="{F55EE3FB-2143-479B-AFC5-2113EBFF36B5}" type="datetimeFigureOut">
               <a:rPr lang="he-IL" smtClean="0"/>
-              <a:t>י"ט/אלול/תשפ"א</a:t>
+              <a:t>כ"א/אלול/תשפ"א</a:t>
             </a:fld>
             <a:endParaRPr lang="he-IL"/>
           </a:p>
@@ -871,7 +871,7 @@
           <a:p>
             <a:fld id="{F55EE3FB-2143-479B-AFC5-2113EBFF36B5}" type="datetimeFigureOut">
               <a:rPr lang="he-IL" smtClean="0"/>
-              <a:t>י"ט/אלול/תשפ"א</a:t>
+              <a:t>כ"א/אלול/תשפ"א</a:t>
             </a:fld>
             <a:endParaRPr lang="he-IL"/>
           </a:p>
@@ -1147,7 +1147,7 @@
           <a:p>
             <a:fld id="{F55EE3FB-2143-479B-AFC5-2113EBFF36B5}" type="datetimeFigureOut">
               <a:rPr lang="he-IL" smtClean="0"/>
-              <a:t>י"ט/אלול/תשפ"א</a:t>
+              <a:t>כ"א/אלול/תשפ"א</a:t>
             </a:fld>
             <a:endParaRPr lang="he-IL"/>
           </a:p>
@@ -1415,7 +1415,7 @@
           <a:p>
             <a:fld id="{F55EE3FB-2143-479B-AFC5-2113EBFF36B5}" type="datetimeFigureOut">
               <a:rPr lang="he-IL" smtClean="0"/>
-              <a:t>י"ט/אלול/תשפ"א</a:t>
+              <a:t>כ"א/אלול/תשפ"א</a:t>
             </a:fld>
             <a:endParaRPr lang="he-IL"/>
           </a:p>
@@ -1830,7 +1830,7 @@
           <a:p>
             <a:fld id="{F55EE3FB-2143-479B-AFC5-2113EBFF36B5}" type="datetimeFigureOut">
               <a:rPr lang="he-IL" smtClean="0"/>
-              <a:t>י"ט/אלול/תשפ"א</a:t>
+              <a:t>כ"א/אלול/תשפ"א</a:t>
             </a:fld>
             <a:endParaRPr lang="he-IL"/>
           </a:p>
@@ -1972,7 +1972,7 @@
           <a:p>
             <a:fld id="{F55EE3FB-2143-479B-AFC5-2113EBFF36B5}" type="datetimeFigureOut">
               <a:rPr lang="he-IL" smtClean="0"/>
-              <a:t>י"ט/אלול/תשפ"א</a:t>
+              <a:t>כ"א/אלול/תשפ"א</a:t>
             </a:fld>
             <a:endParaRPr lang="he-IL"/>
           </a:p>
@@ -2085,7 +2085,7 @@
           <a:p>
             <a:fld id="{F55EE3FB-2143-479B-AFC5-2113EBFF36B5}" type="datetimeFigureOut">
               <a:rPr lang="he-IL" smtClean="0"/>
-              <a:t>י"ט/אלול/תשפ"א</a:t>
+              <a:t>כ"א/אלול/תשפ"א</a:t>
             </a:fld>
             <a:endParaRPr lang="he-IL"/>
           </a:p>
@@ -2398,7 +2398,7 @@
           <a:p>
             <a:fld id="{F55EE3FB-2143-479B-AFC5-2113EBFF36B5}" type="datetimeFigureOut">
               <a:rPr lang="he-IL" smtClean="0"/>
-              <a:t>י"ט/אלול/תשפ"א</a:t>
+              <a:t>כ"א/אלול/תשפ"א</a:t>
             </a:fld>
             <a:endParaRPr lang="he-IL"/>
           </a:p>
@@ -2687,7 +2687,7 @@
           <a:p>
             <a:fld id="{F55EE3FB-2143-479B-AFC5-2113EBFF36B5}" type="datetimeFigureOut">
               <a:rPr lang="he-IL" smtClean="0"/>
-              <a:t>י"ט/אלול/תשפ"א</a:t>
+              <a:t>כ"א/אלול/תשפ"א</a:t>
             </a:fld>
             <a:endParaRPr lang="he-IL"/>
           </a:p>
@@ -2930,7 +2930,7 @@
           <a:p>
             <a:fld id="{F55EE3FB-2143-479B-AFC5-2113EBFF36B5}" type="datetimeFigureOut">
               <a:rPr lang="he-IL" smtClean="0"/>
-              <a:t>י"ט/אלול/תשפ"א</a:t>
+              <a:t>כ"א/אלול/תשפ"א</a:t>
             </a:fld>
             <a:endParaRPr lang="he-IL"/>
           </a:p>
@@ -3347,6 +3347,45 @@
           <a:chExt cx="0" cy="0"/>
         </a:xfrm>
       </p:grpSpPr>
+      <p:pic>
+        <p:nvPicPr>
+          <p:cNvPr id="18" name="Graphic 17" descr="Shopping cart outline">
+            <a:extLst>
+              <a:ext uri="{FF2B5EF4-FFF2-40B4-BE49-F238E27FC236}">
+                <a16:creationId xmlns:a16="http://schemas.microsoft.com/office/drawing/2014/main" id="{61067AF6-3D1B-46D9-BCE2-777D8C7393A8}"/>
+              </a:ext>
+            </a:extLst>
+          </p:cNvPr>
+          <p:cNvPicPr>
+            <a:picLocks noChangeAspect="1"/>
+          </p:cNvPicPr>
+          <p:nvPr/>
+        </p:nvPicPr>
+        <p:blipFill>
+          <a:blip r:embed="rId2">
+            <a:extLst>
+              <a:ext uri="{28A0092B-C50C-407E-A947-70E740481C1C}">
+                <a14:useLocalDpi xmlns:a14="http://schemas.microsoft.com/office/drawing/2010/main" val="0"/>
+              </a:ext>
+              <a:ext uri="{96DAC541-7B7A-43D3-8B79-37D633B846F1}">
+                <asvg:svgBlip xmlns:asvg="http://schemas.microsoft.com/office/drawing/2016/SVG/main" r:embed="rId3"/>
+              </a:ext>
+            </a:extLst>
+          </a:blip>
+          <a:stretch>
+            <a:fillRect/>
+          </a:stretch>
+        </p:blipFill>
+        <p:spPr>
+          <a:xfrm>
+            <a:off x="2960465" y="4938963"/>
+            <a:ext cx="914400" cy="914400"/>
+          </a:xfrm>
+          <a:prstGeom prst="rect">
+            <a:avLst/>
+          </a:prstGeom>
+        </p:spPr>
+      </p:pic>
       <p:sp>
         <p:nvSpPr>
           <p:cNvPr id="15" name="Rectangle: Diagonal Corners Rounded 14">
@@ -3361,7 +3400,7 @@
         </p:nvSpPr>
         <p:spPr>
           <a:xfrm rot="3330257">
-            <a:off x="6136480" y="4963171"/>
+            <a:off x="6136480" y="5001275"/>
             <a:ext cx="383681" cy="309579"/>
           </a:xfrm>
           <a:prstGeom prst="round2DiagRect">
@@ -3868,10 +3907,10 @@
       </p:pic>
       <p:pic>
         <p:nvPicPr>
-          <p:cNvPr id="16" name="Graphic 15" descr="Shopping cart outline">
-            <a:extLst>
-              <a:ext uri="{FF2B5EF4-FFF2-40B4-BE49-F238E27FC236}">
-                <a16:creationId xmlns:a16="http://schemas.microsoft.com/office/drawing/2014/main" id="{8AA2F912-3AE3-434A-AB23-DA7FB150DCE4}"/>
+          <p:cNvPr id="12" name="Graphic 11" descr="Store with solid fill">
+            <a:extLst>
+              <a:ext uri="{FF2B5EF4-FFF2-40B4-BE49-F238E27FC236}">
+                <a16:creationId xmlns:a16="http://schemas.microsoft.com/office/drawing/2014/main" id="{78095D85-E1FB-46B2-87EA-B4E8D32D675E}"/>
               </a:ext>
             </a:extLst>
           </p:cNvPr>
@@ -3897,71 +3936,206 @@
         </p:blipFill>
         <p:spPr>
           <a:xfrm>
-            <a:off x="4689254" y="5217137"/>
-            <a:ext cx="810000" cy="810000"/>
+            <a:off x="8648126" y="5133121"/>
+            <a:ext cx="914400" cy="914400"/>
           </a:xfrm>
           <a:prstGeom prst="rect">
             <a:avLst/>
           </a:prstGeom>
         </p:spPr>
       </p:pic>
-      <p:sp>
-        <p:nvSpPr>
-          <p:cNvPr id="17" name="Arc 16">
-            <a:extLst>
-              <a:ext uri="{FF2B5EF4-FFF2-40B4-BE49-F238E27FC236}">
-                <a16:creationId xmlns:a16="http://schemas.microsoft.com/office/drawing/2014/main" id="{FF258B6E-FCEF-4953-AC70-2FB70DF4C8D3}"/>
-              </a:ext>
-            </a:extLst>
-          </p:cNvPr>
-          <p:cNvSpPr/>
+      <p:grpSp>
+        <p:nvGrpSpPr>
+          <p:cNvPr id="24" name="Group 23">
+            <a:extLst>
+              <a:ext uri="{FF2B5EF4-FFF2-40B4-BE49-F238E27FC236}">
+                <a16:creationId xmlns:a16="http://schemas.microsoft.com/office/drawing/2014/main" id="{3D926486-0F03-466A-87E6-428D8F8D9345}"/>
+              </a:ext>
+            </a:extLst>
+          </p:cNvPr>
+          <p:cNvGrpSpPr/>
           <p:nvPr/>
-        </p:nvSpPr>
+        </p:nvGrpSpPr>
+        <p:grpSpPr>
+          <a:xfrm>
+            <a:off x="3334865" y="4938963"/>
+            <a:ext cx="540000" cy="540000"/>
+            <a:chOff x="2273823" y="5371113"/>
+            <a:chExt cx="360000" cy="357750"/>
+          </a:xfrm>
+        </p:grpSpPr>
+        <p:sp>
+          <p:nvSpPr>
+            <p:cNvPr id="23" name="Oval 22">
+              <a:extLst>
+                <a:ext uri="{FF2B5EF4-FFF2-40B4-BE49-F238E27FC236}">
+                  <a16:creationId xmlns:a16="http://schemas.microsoft.com/office/drawing/2014/main" id="{E20CF7A0-4A38-4F95-ABCF-612E46A8041F}"/>
+                </a:ext>
+              </a:extLst>
+            </p:cNvPr>
+            <p:cNvSpPr/>
+            <p:nvPr/>
+          </p:nvSpPr>
+          <p:spPr>
+            <a:xfrm>
+              <a:off x="2314575" y="5408068"/>
+              <a:ext cx="278606" cy="271213"/>
+            </a:xfrm>
+            <a:prstGeom prst="ellipse">
+              <a:avLst/>
+            </a:prstGeom>
+            <a:solidFill>
+              <a:schemeClr val="bg1"/>
+            </a:solidFill>
+            <a:ln>
+              <a:solidFill>
+                <a:schemeClr val="bg1"/>
+              </a:solidFill>
+            </a:ln>
+          </p:spPr>
+          <p:style>
+            <a:lnRef idx="2">
+              <a:schemeClr val="accent1">
+                <a:shade val="50000"/>
+              </a:schemeClr>
+            </a:lnRef>
+            <a:fillRef idx="1">
+              <a:schemeClr val="accent1"/>
+            </a:fillRef>
+            <a:effectRef idx="0">
+              <a:schemeClr val="accent1"/>
+            </a:effectRef>
+            <a:fontRef idx="minor">
+              <a:schemeClr val="lt1"/>
+            </a:fontRef>
+          </p:style>
+          <p:txBody>
+            <a:bodyPr rtlCol="1" anchor="ctr"/>
+            <a:lstStyle/>
+            <a:p>
+              <a:pPr algn="ctr"/>
+              <a:endParaRPr lang="he-IL" dirty="0"/>
+            </a:p>
+          </p:txBody>
+        </p:sp>
+        <p:pic>
+          <p:nvPicPr>
+            <p:cNvPr id="22" name="Graphic 21" descr="Clock with solid fill">
+              <a:extLst>
+                <a:ext uri="{FF2B5EF4-FFF2-40B4-BE49-F238E27FC236}">
+                  <a16:creationId xmlns:a16="http://schemas.microsoft.com/office/drawing/2014/main" id="{E1CFBC2A-C47E-40AA-9312-84C4F61BB236}"/>
+                </a:ext>
+              </a:extLst>
+            </p:cNvPr>
+            <p:cNvPicPr>
+              <a:picLocks noChangeAspect="1"/>
+            </p:cNvPicPr>
+            <p:nvPr/>
+          </p:nvPicPr>
+          <p:blipFill>
+            <a:blip r:embed="rId8">
+              <a:extLst>
+                <a:ext uri="{28A0092B-C50C-407E-A947-70E740481C1C}">
+                  <a14:useLocalDpi xmlns:a14="http://schemas.microsoft.com/office/drawing/2010/main" val="0"/>
+                </a:ext>
+                <a:ext uri="{96DAC541-7B7A-43D3-8B79-37D633B846F1}">
+                  <asvg:svgBlip xmlns:asvg="http://schemas.microsoft.com/office/drawing/2016/SVG/main" r:embed="rId9"/>
+                </a:ext>
+              </a:extLst>
+            </a:blip>
+            <a:stretch>
+              <a:fillRect/>
+            </a:stretch>
+          </p:blipFill>
+          <p:spPr>
+            <a:xfrm>
+              <a:off x="2273823" y="5371113"/>
+              <a:ext cx="360000" cy="357750"/>
+            </a:xfrm>
+            <a:prstGeom prst="rect">
+              <a:avLst/>
+            </a:prstGeom>
+          </p:spPr>
+        </p:pic>
+      </p:grpSp>
+      <p:pic>
+        <p:nvPicPr>
+          <p:cNvPr id="30" name="Graphic 29" descr="Modern architecture outline">
+            <a:extLst>
+              <a:ext uri="{FF2B5EF4-FFF2-40B4-BE49-F238E27FC236}">
+                <a16:creationId xmlns:a16="http://schemas.microsoft.com/office/drawing/2014/main" id="{2CBD7339-5126-45CE-B68E-D42FE061D249}"/>
+              </a:ext>
+            </a:extLst>
+          </p:cNvPr>
+          <p:cNvPicPr>
+            <a:picLocks noChangeAspect="1"/>
+          </p:cNvPicPr>
+          <p:nvPr/>
+        </p:nvPicPr>
+        <p:blipFill>
+          <a:blip r:embed="rId10">
+            <a:extLst>
+              <a:ext uri="{28A0092B-C50C-407E-A947-70E740481C1C}">
+                <a14:useLocalDpi xmlns:a14="http://schemas.microsoft.com/office/drawing/2010/main" val="0"/>
+              </a:ext>
+              <a:ext uri="{96DAC541-7B7A-43D3-8B79-37D633B846F1}">
+                <asvg:svgBlip xmlns:asvg="http://schemas.microsoft.com/office/drawing/2016/SVG/main" r:embed="rId11"/>
+              </a:ext>
+            </a:extLst>
+          </a:blip>
+          <a:stretch>
+            <a:fillRect/>
+          </a:stretch>
+        </p:blipFill>
         <p:spPr>
           <a:xfrm>
-            <a:off x="4642921" y="5127137"/>
-            <a:ext cx="900000" cy="900000"/>
+            <a:off x="9343549" y="3082204"/>
+            <a:ext cx="914400" cy="914400"/>
           </a:xfrm>
-          <a:prstGeom prst="arc">
-            <a:avLst>
-              <a:gd name="adj1" fmla="val 17555401"/>
-              <a:gd name="adj2" fmla="val 14344439"/>
-            </a:avLst>
+          <a:prstGeom prst="rect">
+            <a:avLst/>
           </a:prstGeom>
-          <a:ln w="57150">
-            <a:solidFill>
-              <a:schemeClr val="tx1">
-                <a:lumMod val="75000"/>
-                <a:lumOff val="25000"/>
-              </a:schemeClr>
-            </a:solidFill>
-            <a:headEnd type="stealth" w="med" len="med"/>
-            <a:tailEnd type="none" w="lg" len="lg"/>
-          </a:ln>
         </p:spPr>
-        <p:style>
-          <a:lnRef idx="1">
-            <a:schemeClr val="accent1"/>
-          </a:lnRef>
-          <a:fillRef idx="0">
-            <a:schemeClr val="accent1"/>
-          </a:fillRef>
-          <a:effectRef idx="0">
-            <a:schemeClr val="accent1"/>
-          </a:effectRef>
-          <a:fontRef idx="minor">
-            <a:schemeClr val="tx1"/>
-          </a:fontRef>
-        </p:style>
-        <p:txBody>
-          <a:bodyPr rtlCol="1" anchor="ctr"/>
-          <a:lstStyle/>
-          <a:p>
-            <a:pPr algn="ctr"/>
-            <a:endParaRPr lang="he-IL" dirty="0"/>
-          </a:p>
-        </p:txBody>
-      </p:sp>
+      </p:pic>
+      <p:pic>
+        <p:nvPicPr>
+          <p:cNvPr id="31" name="Graphic 30" descr="Store outline">
+            <a:extLst>
+              <a:ext uri="{FF2B5EF4-FFF2-40B4-BE49-F238E27FC236}">
+                <a16:creationId xmlns:a16="http://schemas.microsoft.com/office/drawing/2014/main" id="{8F96A8C5-9F40-474E-9751-A2A6E1F61FBD}"/>
+              </a:ext>
+            </a:extLst>
+          </p:cNvPr>
+          <p:cNvPicPr>
+            <a:picLocks noChangeAspect="1"/>
+          </p:cNvPicPr>
+          <p:nvPr/>
+        </p:nvPicPr>
+        <p:blipFill>
+          <a:blip r:embed="rId12">
+            <a:extLst>
+              <a:ext uri="{28A0092B-C50C-407E-A947-70E740481C1C}">
+                <a14:useLocalDpi xmlns:a14="http://schemas.microsoft.com/office/drawing/2010/main" val="0"/>
+              </a:ext>
+              <a:ext uri="{96DAC541-7B7A-43D3-8B79-37D633B846F1}">
+                <asvg:svgBlip xmlns:asvg="http://schemas.microsoft.com/office/drawing/2016/SVG/main" r:embed="rId13"/>
+              </a:ext>
+            </a:extLst>
+          </a:blip>
+          <a:stretch>
+            <a:fillRect/>
+          </a:stretch>
+        </p:blipFill>
+        <p:spPr>
+          <a:xfrm>
+            <a:off x="7107448" y="5156064"/>
+            <a:ext cx="914400" cy="914400"/>
+          </a:xfrm>
+          <a:prstGeom prst="rect">
+            <a:avLst/>
+          </a:prstGeom>
+        </p:spPr>
+      </p:pic>
     </p:spTree>
     <p:extLst>
       <p:ext uri="{BB962C8B-B14F-4D97-AF65-F5344CB8AC3E}">

</xml_diff>